<commit_message>
add predicate-logic6.pptx &7 edit 5, ps1 preface
</commit_message>
<xml_diff>
--- a/spring16/slidesS16/predicate-logic5.pptx
+++ b/spring16/slidesS16/predicate-logic5.pptx
@@ -22,10 +22,10 @@
     <p:sldId id="266" r:id="rId10"/>
     <p:sldId id="267" r:id="rId11"/>
     <p:sldId id="270" r:id="rId12"/>
-    <p:sldId id="263" r:id="rId13"/>
-    <p:sldId id="271" r:id="rId14"/>
-    <p:sldId id="265" r:id="rId15"/>
-    <p:sldId id="262" r:id="rId16"/>
+    <p:sldId id="271" r:id="rId13"/>
+    <p:sldId id="265" r:id="rId14"/>
+    <p:sldId id="262" r:id="rId15"/>
+    <p:sldId id="263" r:id="rId16"/>
   </p:sldIdLst>
   <p:sldSz cx="9144000" cy="6858000" type="screen4x3"/>
   <p:notesSz cx="9601200" cy="7315200"/>
@@ -2589,7 +2589,7 @@
             <a:graphicData uri="http://schemas.openxmlformats.org/presentationml/2006/ole">
               <mc:AlternateContent xmlns:mc="http://schemas.openxmlformats.org/markup-compatibility/2006">
                 <mc:Choice xmlns:v="urn:schemas-microsoft-com:vml" Requires="v">
-                  <p:oleObj spid="_x0000_s9218" name="Equation" r:id="rId3" imgW="203200" imgH="787400" progId="Equation.DSMT4">
+                  <p:oleObj spid="_x0000_s9219" name="Equation" r:id="rId3" imgW="203200" imgH="787400" progId="Equation.DSMT4">
                     <p:embed/>
                   </p:oleObj>
                 </mc:Choice>
@@ -3003,6 +3003,650 @@
 </file>
 
 <file path=ppt/slides/slide12.xml><?xml version="1.0" encoding="utf-8"?>
+<p:sld xmlns:a="http://schemas.openxmlformats.org/drawingml/2006/main" xmlns:r="http://schemas.openxmlformats.org/officeDocument/2006/relationships" xmlns:p="http://schemas.openxmlformats.org/presentationml/2006/main">
+  <p:cSld>
+    <p:spTree>
+      <p:nvGrpSpPr>
+        <p:cNvPr id="1" name=""/>
+        <p:cNvGrpSpPr/>
+        <p:nvPr/>
+      </p:nvGrpSpPr>
+      <p:grpSpPr>
+        <a:xfrm>
+          <a:off x="0" y="0"/>
+          <a:ext cx="0" cy="0"/>
+          <a:chOff x="0" y="0"/>
+          <a:chExt cx="0" cy="0"/>
+        </a:xfrm>
+      </p:grpSpPr>
+      <p:sp>
+        <p:nvSpPr>
+          <p:cNvPr id="3" name="Content Placeholder 2"/>
+          <p:cNvSpPr>
+            <a:spLocks noGrp="1"/>
+          </p:cNvSpPr>
+          <p:nvPr>
+            <p:ph idx="1"/>
+          </p:nvPr>
+        </p:nvSpPr>
+        <p:spPr>
+          <a:xfrm>
+            <a:off x="540287" y="1588330"/>
+            <a:ext cx="8361871" cy="4904662"/>
+          </a:xfrm>
+        </p:spPr>
+        <p:txBody>
+          <a:bodyPr/>
+          <a:lstStyle/>
+          <a:p>
+            <a:r>
+              <a:rPr lang="en-US" dirty="0" smtClean="0"/>
+              <a:t>1.  T := R </a:t>
+            </a:r>
+            <a:endParaRPr lang="en-US" dirty="0"/>
+          </a:p>
+          <a:p>
+            <a:r>
+              <a:rPr lang="en-US" dirty="0" smtClean="0"/>
+              <a:t>2. U := S          (U is a temp)</a:t>
+            </a:r>
+          </a:p>
+        </p:txBody>
+      </p:sp>
+      <p:sp>
+        <p:nvSpPr>
+          <p:cNvPr id="5" name="TextBox 4"/>
+          <p:cNvSpPr txBox="1"/>
+          <p:nvPr/>
+        </p:nvSpPr>
+        <p:spPr>
+          <a:xfrm>
+            <a:off x="1408018" y="305832"/>
+            <a:ext cx="7107384" cy="1200329"/>
+          </a:xfrm>
+          <a:prstGeom prst="rect">
+            <a:avLst/>
+          </a:prstGeom>
+          <a:noFill/>
+        </p:spPr>
+        <p:txBody>
+          <a:bodyPr wrap="none" rtlCol="0">
+            <a:spAutoFit/>
+          </a:bodyPr>
+          <a:lstStyle/>
+          <a:p>
+            <a:r>
+              <a:rPr lang="en-US" sz="7200" dirty="0" smtClean="0">
+                <a:solidFill>
+                  <a:srgbClr val="0000FF"/>
+                </a:solidFill>
+                <a:latin typeface="Comic Sans MS"/>
+                <a:cs typeface="Comic Sans MS"/>
+              </a:rPr>
+              <a:t>T :</a:t>
+            </a:r>
+            <a:r>
+              <a:rPr lang="en-US" sz="7200" dirty="0" smtClean="0">
+                <a:solidFill>
+                  <a:srgbClr val="0000FF"/>
+                </a:solidFill>
+                <a:latin typeface="Euclid S\"/>
+                <a:cs typeface="Euclid S\"/>
+              </a:rPr>
+              <a:t>=</a:t>
+            </a:r>
+            <a:r>
+              <a:rPr lang="en-US" sz="7200" dirty="0" smtClean="0">
+                <a:solidFill>
+                  <a:srgbClr val="0000FF"/>
+                </a:solidFill>
+                <a:latin typeface="Comic Sans MS"/>
+                <a:cs typeface="Comic Sans MS"/>
+              </a:rPr>
+              <a:t> R+S   </a:t>
+            </a:r>
+            <a:r>
+              <a:rPr lang="en-US" sz="7200" dirty="0" smtClean="0">
+                <a:latin typeface="Comic Sans MS"/>
+                <a:cs typeface="Comic Sans MS"/>
+              </a:rPr>
+              <a:t>(Add)</a:t>
+            </a:r>
+            <a:endParaRPr lang="en-US" sz="7200" dirty="0">
+              <a:solidFill>
+                <a:srgbClr val="0000FF"/>
+              </a:solidFill>
+              <a:latin typeface="Comic Sans MS"/>
+              <a:cs typeface="Comic Sans MS"/>
+            </a:endParaRPr>
+          </a:p>
+        </p:txBody>
+      </p:sp>
+    </p:spTree>
+    <p:extLst>
+      <p:ext uri="{BB962C8B-B14F-4D97-AF65-F5344CB8AC3E}">
+        <p14:creationId xmlns:p14="http://schemas.microsoft.com/office/powerpoint/2010/main" val="3129446225"/>
+      </p:ext>
+    </p:extLst>
+  </p:cSld>
+  <p:clrMapOvr>
+    <a:masterClrMapping/>
+  </p:clrMapOvr>
+  <p:timing>
+    <p:tnLst>
+      <p:par>
+        <p:cTn xmlns:p14="http://schemas.microsoft.com/office/powerpoint/2010/main" id="1" dur="indefinite" restart="never" nodeType="tmRoot"/>
+      </p:par>
+    </p:tnLst>
+  </p:timing>
+</p:sld>
+</file>
+
+<file path=ppt/slides/slide13.xml><?xml version="1.0" encoding="utf-8"?>
+<p:sld xmlns:a="http://schemas.openxmlformats.org/drawingml/2006/main" xmlns:r="http://schemas.openxmlformats.org/officeDocument/2006/relationships" xmlns:p="http://schemas.openxmlformats.org/presentationml/2006/main">
+  <p:cSld>
+    <p:spTree>
+      <p:nvGrpSpPr>
+        <p:cNvPr id="1" name=""/>
+        <p:cNvGrpSpPr/>
+        <p:nvPr/>
+      </p:nvGrpSpPr>
+      <p:grpSpPr>
+        <a:xfrm>
+          <a:off x="0" y="0"/>
+          <a:ext cx="0" cy="0"/>
+          <a:chOff x="0" y="0"/>
+          <a:chExt cx="0" cy="0"/>
+        </a:xfrm>
+      </p:grpSpPr>
+      <p:sp>
+        <p:nvSpPr>
+          <p:cNvPr id="3" name="Content Placeholder 2"/>
+          <p:cNvSpPr>
+            <a:spLocks noGrp="1"/>
+          </p:cNvSpPr>
+          <p:nvPr>
+            <p:ph idx="1"/>
+          </p:nvPr>
+        </p:nvSpPr>
+        <p:spPr>
+          <a:xfrm>
+            <a:off x="540287" y="1588330"/>
+            <a:ext cx="8361871" cy="4904662"/>
+          </a:xfrm>
+        </p:spPr>
+        <p:txBody>
+          <a:bodyPr/>
+          <a:lstStyle/>
+          <a:p>
+            <a:r>
+              <a:rPr lang="en-US" dirty="0" smtClean="0"/>
+              <a:t>1.  T </a:t>
+            </a:r>
+            <a:r>
+              <a:rPr lang="en-US" dirty="0"/>
+              <a:t>:= R </a:t>
+            </a:r>
+          </a:p>
+          <a:p>
+            <a:r>
+              <a:rPr lang="en-US" dirty="0"/>
+              <a:t>2. U := S  </a:t>
+            </a:r>
+            <a:endParaRPr lang="en-US" dirty="0" smtClean="0"/>
+          </a:p>
+          <a:p>
+            <a:r>
+              <a:rPr lang="en-US" dirty="0" smtClean="0"/>
+              <a:t>3. [U? halt 4]</a:t>
+            </a:r>
+          </a:p>
+          <a:p>
+            <a:r>
+              <a:rPr lang="en-US" dirty="0" smtClean="0"/>
+              <a:t>4. T+</a:t>
+            </a:r>
+          </a:p>
+          <a:p>
+            <a:r>
+              <a:rPr lang="en-US" dirty="0"/>
+              <a:t>5</a:t>
+            </a:r>
+            <a:r>
+              <a:rPr lang="en-US" dirty="0" smtClean="0"/>
+              <a:t>. U-</a:t>
+            </a:r>
+          </a:p>
+          <a:p>
+            <a:r>
+              <a:rPr lang="en-US" dirty="0" smtClean="0"/>
+              <a:t>6. </a:t>
+            </a:r>
+            <a:r>
+              <a:rPr lang="en-US" dirty="0" err="1"/>
+              <a:t>goto</a:t>
+            </a:r>
+            <a:r>
+              <a:rPr lang="en-US" dirty="0"/>
+              <a:t> </a:t>
+            </a:r>
+            <a:r>
+              <a:rPr lang="en-US" dirty="0" smtClean="0"/>
+              <a:t>3</a:t>
+            </a:r>
+          </a:p>
+        </p:txBody>
+      </p:sp>
+      <p:sp>
+        <p:nvSpPr>
+          <p:cNvPr id="5" name="TextBox 4"/>
+          <p:cNvSpPr txBox="1"/>
+          <p:nvPr/>
+        </p:nvSpPr>
+        <p:spPr>
+          <a:xfrm>
+            <a:off x="1408018" y="305832"/>
+            <a:ext cx="7107384" cy="1200329"/>
+          </a:xfrm>
+          <a:prstGeom prst="rect">
+            <a:avLst/>
+          </a:prstGeom>
+          <a:noFill/>
+        </p:spPr>
+        <p:txBody>
+          <a:bodyPr wrap="none" rtlCol="0">
+            <a:spAutoFit/>
+          </a:bodyPr>
+          <a:lstStyle/>
+          <a:p>
+            <a:r>
+              <a:rPr lang="en-US" sz="7200" dirty="0" smtClean="0">
+                <a:solidFill>
+                  <a:srgbClr val="0000FF"/>
+                </a:solidFill>
+                <a:latin typeface="Comic Sans MS"/>
+                <a:cs typeface="Comic Sans MS"/>
+              </a:rPr>
+              <a:t>T :</a:t>
+            </a:r>
+            <a:r>
+              <a:rPr lang="en-US" sz="7200" dirty="0" smtClean="0">
+                <a:solidFill>
+                  <a:srgbClr val="0000FF"/>
+                </a:solidFill>
+                <a:latin typeface="Euclid S\"/>
+                <a:cs typeface="Euclid S\"/>
+              </a:rPr>
+              <a:t>=</a:t>
+            </a:r>
+            <a:r>
+              <a:rPr lang="en-US" sz="7200" dirty="0" smtClean="0">
+                <a:solidFill>
+                  <a:srgbClr val="0000FF"/>
+                </a:solidFill>
+                <a:latin typeface="Comic Sans MS"/>
+                <a:cs typeface="Comic Sans MS"/>
+              </a:rPr>
+              <a:t> R+S   </a:t>
+            </a:r>
+            <a:r>
+              <a:rPr lang="en-US" sz="7200" dirty="0" smtClean="0">
+                <a:latin typeface="Comic Sans MS"/>
+                <a:cs typeface="Comic Sans MS"/>
+              </a:rPr>
+              <a:t>(Add)</a:t>
+            </a:r>
+            <a:endParaRPr lang="en-US" sz="7200" dirty="0">
+              <a:solidFill>
+                <a:srgbClr val="0000FF"/>
+              </a:solidFill>
+              <a:latin typeface="Comic Sans MS"/>
+              <a:cs typeface="Comic Sans MS"/>
+            </a:endParaRPr>
+          </a:p>
+        </p:txBody>
+      </p:sp>
+      <p:graphicFrame>
+        <p:nvGraphicFramePr>
+          <p:cNvPr id="7" name="Object 6"/>
+          <p:cNvGraphicFramePr>
+            <a:graphicFrameLocks noChangeAspect="1"/>
+          </p:cNvGraphicFramePr>
+          <p:nvPr>
+            <p:extLst>
+              <p:ext uri="{D42A27DB-BD31-4B8C-83A1-F6EECF244321}">
+                <p14:modId xmlns:p14="http://schemas.microsoft.com/office/powerpoint/2010/main" val="1856121898"/>
+              </p:ext>
+            </p:extLst>
+          </p:nvPr>
+        </p:nvGraphicFramePr>
+        <p:xfrm>
+          <a:off x="3306886" y="2657726"/>
+          <a:ext cx="720793" cy="2797704"/>
+        </p:xfrm>
+        <a:graphic>
+          <a:graphicData uri="http://schemas.openxmlformats.org/presentationml/2006/ole">
+            <mc:AlternateContent xmlns:mc="http://schemas.openxmlformats.org/markup-compatibility/2006">
+              <mc:Choice xmlns:v="urn:schemas-microsoft-com:vml" Requires="v">
+                <p:oleObj spid="_x0000_s7171" name="Equation" r:id="rId3" imgW="203200" imgH="787400" progId="Equation.DSMT4">
+                  <p:embed/>
+                </p:oleObj>
+              </mc:Choice>
+              <mc:Fallback>
+                <p:oleObj name="Equation" r:id="rId3" imgW="203200" imgH="787400" progId="Equation.DSMT4">
+                  <p:embed/>
+                  <p:pic>
+                    <p:nvPicPr>
+                      <p:cNvPr id="0" name=""/>
+                      <p:cNvPicPr/>
+                      <p:nvPr/>
+                    </p:nvPicPr>
+                    <p:blipFill>
+                      <a:blip r:embed="rId4"/>
+                      <a:stretch>
+                        <a:fillRect/>
+                      </a:stretch>
+                    </p:blipFill>
+                    <p:spPr>
+                      <a:xfrm>
+                        <a:off x="3306886" y="2657726"/>
+                        <a:ext cx="720793" cy="2797704"/>
+                      </a:xfrm>
+                      <a:prstGeom prst="rect">
+                        <a:avLst/>
+                      </a:prstGeom>
+                    </p:spPr>
+                  </p:pic>
+                </p:oleObj>
+              </mc:Fallback>
+            </mc:AlternateContent>
+          </a:graphicData>
+        </a:graphic>
+      </p:graphicFrame>
+      <p:sp>
+        <p:nvSpPr>
+          <p:cNvPr id="8" name="TextBox 7"/>
+          <p:cNvSpPr txBox="1"/>
+          <p:nvPr/>
+        </p:nvSpPr>
+        <p:spPr>
+          <a:xfrm>
+            <a:off x="4206758" y="3566109"/>
+            <a:ext cx="2943159" cy="923330"/>
+          </a:xfrm>
+          <a:prstGeom prst="rect">
+            <a:avLst/>
+          </a:prstGeom>
+          <a:noFill/>
+        </p:spPr>
+        <p:txBody>
+          <a:bodyPr wrap="none" rtlCol="0">
+            <a:spAutoFit/>
+          </a:bodyPr>
+          <a:lstStyle/>
+          <a:p>
+            <a:r>
+              <a:rPr lang="en-US" sz="5400" dirty="0" smtClean="0">
+                <a:solidFill>
+                  <a:srgbClr val="0000FF"/>
+                </a:solidFill>
+                <a:latin typeface="Comic Sans MS"/>
+                <a:cs typeface="Comic Sans MS"/>
+              </a:rPr>
+              <a:t>T := T+U</a:t>
+            </a:r>
+            <a:endParaRPr lang="en-US" sz="5400" dirty="0">
+              <a:solidFill>
+                <a:srgbClr val="0000FF"/>
+              </a:solidFill>
+              <a:latin typeface="Comic Sans MS"/>
+              <a:cs typeface="Comic Sans MS"/>
+            </a:endParaRPr>
+          </a:p>
+        </p:txBody>
+      </p:sp>
+    </p:spTree>
+    <p:extLst>
+      <p:ext uri="{BB962C8B-B14F-4D97-AF65-F5344CB8AC3E}">
+        <p14:creationId xmlns:p14="http://schemas.microsoft.com/office/powerpoint/2010/main" val="1926243157"/>
+      </p:ext>
+    </p:extLst>
+  </p:cSld>
+  <p:clrMapOvr>
+    <a:masterClrMapping/>
+  </p:clrMapOvr>
+  <p:transition xmlns:p14="http://schemas.microsoft.com/office/powerpoint/2010/main" spd="slow" advClick="0">
+    <p:fade/>
+  </p:transition>
+  <p:timing>
+    <p:tnLst>
+      <p:par>
+        <p:cTn xmlns:p14="http://schemas.microsoft.com/office/powerpoint/2010/main" id="1" dur="indefinite" restart="never" nodeType="tmRoot"/>
+      </p:par>
+    </p:tnLst>
+  </p:timing>
+</p:sld>
+</file>
+
+<file path=ppt/slides/slide14.xml><?xml version="1.0" encoding="utf-8"?>
+<p:sld xmlns:a="http://schemas.openxmlformats.org/drawingml/2006/main" xmlns:r="http://schemas.openxmlformats.org/officeDocument/2006/relationships" xmlns:p="http://schemas.openxmlformats.org/presentationml/2006/main">
+  <p:cSld>
+    <p:spTree>
+      <p:nvGrpSpPr>
+        <p:cNvPr id="1" name=""/>
+        <p:cNvGrpSpPr/>
+        <p:nvPr/>
+      </p:nvGrpSpPr>
+      <p:grpSpPr>
+        <a:xfrm>
+          <a:off x="0" y="0"/>
+          <a:ext cx="0" cy="0"/>
+          <a:chOff x="0" y="0"/>
+          <a:chExt cx="0" cy="0"/>
+        </a:xfrm>
+      </p:grpSpPr>
+      <p:sp>
+        <p:nvSpPr>
+          <p:cNvPr id="3" name="Content Placeholder 2"/>
+          <p:cNvSpPr>
+            <a:spLocks noGrp="1"/>
+          </p:cNvSpPr>
+          <p:nvPr>
+            <p:ph idx="1"/>
+          </p:nvPr>
+        </p:nvSpPr>
+        <p:spPr>
+          <a:xfrm>
+            <a:off x="2285109" y="1671421"/>
+            <a:ext cx="4480531" cy="4560427"/>
+          </a:xfrm>
+        </p:spPr>
+        <p:txBody>
+          <a:bodyPr/>
+          <a:lstStyle/>
+          <a:p>
+            <a:r>
+              <a:rPr lang="en-US" sz="5400" dirty="0" smtClean="0"/>
+              <a:t>1. T := 0          </a:t>
+            </a:r>
+          </a:p>
+          <a:p>
+            <a:r>
+              <a:rPr lang="en-US" sz="5400" dirty="0" smtClean="0"/>
+              <a:t>2. </a:t>
+            </a:r>
+            <a:r>
+              <a:rPr lang="en-US" sz="5400" dirty="0"/>
+              <a:t>[R? halt </a:t>
+            </a:r>
+            <a:r>
+              <a:rPr lang="en-US" sz="5400" dirty="0" smtClean="0"/>
+              <a:t>3]             </a:t>
+            </a:r>
+          </a:p>
+          <a:p>
+            <a:r>
+              <a:rPr lang="en-US" sz="5400" dirty="0" smtClean="0"/>
+              <a:t>3. T := T</a:t>
+            </a:r>
+            <a:r>
+              <a:rPr lang="en-US" sz="5400" dirty="0"/>
+              <a:t>+</a:t>
+            </a:r>
+            <a:r>
+              <a:rPr lang="en-US" sz="5400" dirty="0" smtClean="0"/>
+              <a:t>S</a:t>
+            </a:r>
+          </a:p>
+          <a:p>
+            <a:r>
+              <a:rPr lang="en-US" sz="5400" dirty="0" smtClean="0"/>
+              <a:t>4. </a:t>
+            </a:r>
+            <a:r>
+              <a:rPr lang="en-US" sz="5400" dirty="0" err="1" smtClean="0"/>
+              <a:t>goto</a:t>
+            </a:r>
+            <a:r>
+              <a:rPr lang="en-US" sz="5400" dirty="0" smtClean="0"/>
+              <a:t> 2</a:t>
+            </a:r>
+            <a:endParaRPr lang="en-US" sz="5400" dirty="0"/>
+          </a:p>
+        </p:txBody>
+      </p:sp>
+      <p:sp>
+        <p:nvSpPr>
+          <p:cNvPr id="8" name="TextBox 7"/>
+          <p:cNvSpPr txBox="1"/>
+          <p:nvPr/>
+        </p:nvSpPr>
+        <p:spPr>
+          <a:xfrm>
+            <a:off x="1637997" y="343173"/>
+            <a:ext cx="3554917" cy="1107996"/>
+          </a:xfrm>
+          <a:prstGeom prst="rect">
+            <a:avLst/>
+          </a:prstGeom>
+          <a:noFill/>
+        </p:spPr>
+        <p:txBody>
+          <a:bodyPr wrap="none" rtlCol="0">
+            <a:spAutoFit/>
+          </a:bodyPr>
+          <a:lstStyle/>
+          <a:p>
+            <a:r>
+              <a:rPr lang="en-US" sz="6600" dirty="0" smtClean="0">
+                <a:solidFill>
+                  <a:srgbClr val="0000FF"/>
+                </a:solidFill>
+                <a:latin typeface="Comic Sans MS"/>
+                <a:cs typeface="Comic Sans MS"/>
+              </a:rPr>
+              <a:t>T :</a:t>
+            </a:r>
+            <a:r>
+              <a:rPr lang="en-US" sz="6600" dirty="0" smtClean="0">
+                <a:solidFill>
+                  <a:srgbClr val="0000FF"/>
+                </a:solidFill>
+                <a:latin typeface="Euclid S\"/>
+                <a:cs typeface="Euclid S\"/>
+              </a:rPr>
+              <a:t>=</a:t>
+            </a:r>
+            <a:r>
+              <a:rPr lang="en-US" sz="6600" dirty="0" smtClean="0">
+                <a:solidFill>
+                  <a:srgbClr val="0000FF"/>
+                </a:solidFill>
+                <a:latin typeface="Comic Sans MS"/>
+                <a:cs typeface="Comic Sans MS"/>
+              </a:rPr>
+              <a:t> R</a:t>
+            </a:r>
+            <a:r>
+              <a:rPr lang="en-US" sz="6600" b="1" dirty="0">
+                <a:solidFill>
+                  <a:srgbClr val="0000FF"/>
+                </a:solidFill>
+                <a:latin typeface="Euclid Symbol" charset="2"/>
+                <a:cs typeface="Euclid Symbol" charset="2"/>
+              </a:rPr>
+              <a:t>∗</a:t>
+            </a:r>
+            <a:r>
+              <a:rPr lang="en-US" sz="6600" dirty="0" smtClean="0">
+                <a:solidFill>
+                  <a:srgbClr val="0000FF"/>
+                </a:solidFill>
+                <a:latin typeface="Comic Sans MS"/>
+                <a:cs typeface="Comic Sans MS"/>
+              </a:rPr>
+              <a:t>S</a:t>
+            </a:r>
+          </a:p>
+        </p:txBody>
+      </p:sp>
+      <p:sp>
+        <p:nvSpPr>
+          <p:cNvPr id="10" name="TextBox 9"/>
+          <p:cNvSpPr txBox="1"/>
+          <p:nvPr/>
+        </p:nvSpPr>
+        <p:spPr>
+          <a:xfrm>
+            <a:off x="5732990" y="462937"/>
+            <a:ext cx="2948343" cy="830997"/>
+          </a:xfrm>
+          <a:prstGeom prst="rect">
+            <a:avLst/>
+          </a:prstGeom>
+          <a:noFill/>
+        </p:spPr>
+        <p:txBody>
+          <a:bodyPr wrap="none" rtlCol="0">
+            <a:spAutoFit/>
+          </a:bodyPr>
+          <a:lstStyle/>
+          <a:p>
+            <a:r>
+              <a:rPr lang="en-US" sz="4800" dirty="0" smtClean="0">
+                <a:latin typeface="Comic Sans MS"/>
+                <a:cs typeface="Comic Sans MS"/>
+              </a:rPr>
+              <a:t>(Multiply)  </a:t>
+            </a:r>
+            <a:endParaRPr lang="en-US" sz="4800" dirty="0">
+              <a:latin typeface="Comic Sans MS"/>
+              <a:cs typeface="Comic Sans MS"/>
+            </a:endParaRPr>
+          </a:p>
+        </p:txBody>
+      </p:sp>
+    </p:spTree>
+    <p:extLst>
+      <p:ext uri="{BB962C8B-B14F-4D97-AF65-F5344CB8AC3E}">
+        <p14:creationId xmlns:p14="http://schemas.microsoft.com/office/powerpoint/2010/main" val="3953662585"/>
+      </p:ext>
+    </p:extLst>
+  </p:cSld>
+  <p:clrMapOvr>
+    <a:masterClrMapping/>
+  </p:clrMapOvr>
+  <p:timing>
+    <p:tnLst>
+      <p:par>
+        <p:cTn xmlns:p14="http://schemas.microsoft.com/office/powerpoint/2010/main" id="1" dur="indefinite" restart="never" nodeType="tmRoot"/>
+      </p:par>
+    </p:tnLst>
+  </p:timing>
+</p:sld>
+</file>
+
+<file path=ppt/slides/slide15.xml><?xml version="1.0" encoding="utf-8"?>
 <p:sld xmlns:a="http://schemas.openxmlformats.org/drawingml/2006/main" xmlns:r="http://schemas.openxmlformats.org/officeDocument/2006/relationships" xmlns:p="http://schemas.openxmlformats.org/presentationml/2006/main" show="0">
   <p:cSld>
     <p:spTree>
@@ -3147,7 +3791,7 @@
           <a:graphicData uri="http://schemas.openxmlformats.org/presentationml/2006/ole">
             <mc:AlternateContent xmlns:mc="http://schemas.openxmlformats.org/markup-compatibility/2006">
               <mc:Choice xmlns:v="urn:schemas-microsoft-com:vml" Requires="v">
-                <p:oleObj spid="_x0000_s4103" name="Equation" r:id="rId3" imgW="203200" imgH="787400" progId="Equation.DSMT4">
+                <p:oleObj spid="_x0000_s4104" name="Equation" r:id="rId3" imgW="203200" imgH="787400" progId="Equation.DSMT4">
                   <p:embed/>
                 </p:oleObj>
               </mc:Choice>
@@ -3304,650 +3948,6 @@
       <p:transition xmlns:p14="http://schemas.microsoft.com/office/powerpoint/2010/main" spd="slow"/>
     </mc:Fallback>
   </mc:AlternateContent>
-  <p:timing>
-    <p:tnLst>
-      <p:par>
-        <p:cTn xmlns:p14="http://schemas.microsoft.com/office/powerpoint/2010/main" id="1" dur="indefinite" restart="never" nodeType="tmRoot"/>
-      </p:par>
-    </p:tnLst>
-  </p:timing>
-</p:sld>
-</file>
-
-<file path=ppt/slides/slide13.xml><?xml version="1.0" encoding="utf-8"?>
-<p:sld xmlns:a="http://schemas.openxmlformats.org/drawingml/2006/main" xmlns:r="http://schemas.openxmlformats.org/officeDocument/2006/relationships" xmlns:p="http://schemas.openxmlformats.org/presentationml/2006/main">
-  <p:cSld>
-    <p:spTree>
-      <p:nvGrpSpPr>
-        <p:cNvPr id="1" name=""/>
-        <p:cNvGrpSpPr/>
-        <p:nvPr/>
-      </p:nvGrpSpPr>
-      <p:grpSpPr>
-        <a:xfrm>
-          <a:off x="0" y="0"/>
-          <a:ext cx="0" cy="0"/>
-          <a:chOff x="0" y="0"/>
-          <a:chExt cx="0" cy="0"/>
-        </a:xfrm>
-      </p:grpSpPr>
-      <p:sp>
-        <p:nvSpPr>
-          <p:cNvPr id="3" name="Content Placeholder 2"/>
-          <p:cNvSpPr>
-            <a:spLocks noGrp="1"/>
-          </p:cNvSpPr>
-          <p:nvPr>
-            <p:ph idx="1"/>
-          </p:nvPr>
-        </p:nvSpPr>
-        <p:spPr>
-          <a:xfrm>
-            <a:off x="540287" y="1588330"/>
-            <a:ext cx="8361871" cy="4904662"/>
-          </a:xfrm>
-        </p:spPr>
-        <p:txBody>
-          <a:bodyPr/>
-          <a:lstStyle/>
-          <a:p>
-            <a:r>
-              <a:rPr lang="en-US" dirty="0" smtClean="0"/>
-              <a:t>1.  T := R </a:t>
-            </a:r>
-            <a:endParaRPr lang="en-US" dirty="0"/>
-          </a:p>
-          <a:p>
-            <a:r>
-              <a:rPr lang="en-US" dirty="0" smtClean="0"/>
-              <a:t>2. U := S          (U is a temp)</a:t>
-            </a:r>
-          </a:p>
-        </p:txBody>
-      </p:sp>
-      <p:sp>
-        <p:nvSpPr>
-          <p:cNvPr id="5" name="TextBox 4"/>
-          <p:cNvSpPr txBox="1"/>
-          <p:nvPr/>
-        </p:nvSpPr>
-        <p:spPr>
-          <a:xfrm>
-            <a:off x="1408018" y="305832"/>
-            <a:ext cx="7107384" cy="1200329"/>
-          </a:xfrm>
-          <a:prstGeom prst="rect">
-            <a:avLst/>
-          </a:prstGeom>
-          <a:noFill/>
-        </p:spPr>
-        <p:txBody>
-          <a:bodyPr wrap="none" rtlCol="0">
-            <a:spAutoFit/>
-          </a:bodyPr>
-          <a:lstStyle/>
-          <a:p>
-            <a:r>
-              <a:rPr lang="en-US" sz="7200" dirty="0" smtClean="0">
-                <a:solidFill>
-                  <a:srgbClr val="0000FF"/>
-                </a:solidFill>
-                <a:latin typeface="Comic Sans MS"/>
-                <a:cs typeface="Comic Sans MS"/>
-              </a:rPr>
-              <a:t>T :</a:t>
-            </a:r>
-            <a:r>
-              <a:rPr lang="en-US" sz="7200" dirty="0" smtClean="0">
-                <a:solidFill>
-                  <a:srgbClr val="0000FF"/>
-                </a:solidFill>
-                <a:latin typeface="Euclid S\"/>
-                <a:cs typeface="Euclid S\"/>
-              </a:rPr>
-              <a:t>=</a:t>
-            </a:r>
-            <a:r>
-              <a:rPr lang="en-US" sz="7200" dirty="0" smtClean="0">
-                <a:solidFill>
-                  <a:srgbClr val="0000FF"/>
-                </a:solidFill>
-                <a:latin typeface="Comic Sans MS"/>
-                <a:cs typeface="Comic Sans MS"/>
-              </a:rPr>
-              <a:t> R+S   </a:t>
-            </a:r>
-            <a:r>
-              <a:rPr lang="en-US" sz="7200" dirty="0" smtClean="0">
-                <a:latin typeface="Comic Sans MS"/>
-                <a:cs typeface="Comic Sans MS"/>
-              </a:rPr>
-              <a:t>(Add)</a:t>
-            </a:r>
-            <a:endParaRPr lang="en-US" sz="7200" dirty="0">
-              <a:solidFill>
-                <a:srgbClr val="0000FF"/>
-              </a:solidFill>
-              <a:latin typeface="Comic Sans MS"/>
-              <a:cs typeface="Comic Sans MS"/>
-            </a:endParaRPr>
-          </a:p>
-        </p:txBody>
-      </p:sp>
-    </p:spTree>
-    <p:extLst>
-      <p:ext uri="{BB962C8B-B14F-4D97-AF65-F5344CB8AC3E}">
-        <p14:creationId xmlns:p14="http://schemas.microsoft.com/office/powerpoint/2010/main" val="3129446225"/>
-      </p:ext>
-    </p:extLst>
-  </p:cSld>
-  <p:clrMapOvr>
-    <a:masterClrMapping/>
-  </p:clrMapOvr>
-  <p:timing>
-    <p:tnLst>
-      <p:par>
-        <p:cTn xmlns:p14="http://schemas.microsoft.com/office/powerpoint/2010/main" id="1" dur="indefinite" restart="never" nodeType="tmRoot"/>
-      </p:par>
-    </p:tnLst>
-  </p:timing>
-</p:sld>
-</file>
-
-<file path=ppt/slides/slide14.xml><?xml version="1.0" encoding="utf-8"?>
-<p:sld xmlns:a="http://schemas.openxmlformats.org/drawingml/2006/main" xmlns:r="http://schemas.openxmlformats.org/officeDocument/2006/relationships" xmlns:p="http://schemas.openxmlformats.org/presentationml/2006/main">
-  <p:cSld>
-    <p:spTree>
-      <p:nvGrpSpPr>
-        <p:cNvPr id="1" name=""/>
-        <p:cNvGrpSpPr/>
-        <p:nvPr/>
-      </p:nvGrpSpPr>
-      <p:grpSpPr>
-        <a:xfrm>
-          <a:off x="0" y="0"/>
-          <a:ext cx="0" cy="0"/>
-          <a:chOff x="0" y="0"/>
-          <a:chExt cx="0" cy="0"/>
-        </a:xfrm>
-      </p:grpSpPr>
-      <p:sp>
-        <p:nvSpPr>
-          <p:cNvPr id="3" name="Content Placeholder 2"/>
-          <p:cNvSpPr>
-            <a:spLocks noGrp="1"/>
-          </p:cNvSpPr>
-          <p:nvPr>
-            <p:ph idx="1"/>
-          </p:nvPr>
-        </p:nvSpPr>
-        <p:spPr>
-          <a:xfrm>
-            <a:off x="540287" y="1588330"/>
-            <a:ext cx="8361871" cy="4904662"/>
-          </a:xfrm>
-        </p:spPr>
-        <p:txBody>
-          <a:bodyPr/>
-          <a:lstStyle/>
-          <a:p>
-            <a:r>
-              <a:rPr lang="en-US" dirty="0" smtClean="0"/>
-              <a:t>1.  T </a:t>
-            </a:r>
-            <a:r>
-              <a:rPr lang="en-US" dirty="0"/>
-              <a:t>:= R </a:t>
-            </a:r>
-          </a:p>
-          <a:p>
-            <a:r>
-              <a:rPr lang="en-US" dirty="0"/>
-              <a:t>2. U := S  </a:t>
-            </a:r>
-            <a:endParaRPr lang="en-US" dirty="0" smtClean="0"/>
-          </a:p>
-          <a:p>
-            <a:r>
-              <a:rPr lang="en-US" dirty="0" smtClean="0"/>
-              <a:t>3. [U? halt 4]</a:t>
-            </a:r>
-          </a:p>
-          <a:p>
-            <a:r>
-              <a:rPr lang="en-US" dirty="0" smtClean="0"/>
-              <a:t>4. T+</a:t>
-            </a:r>
-          </a:p>
-          <a:p>
-            <a:r>
-              <a:rPr lang="en-US" dirty="0"/>
-              <a:t>5</a:t>
-            </a:r>
-            <a:r>
-              <a:rPr lang="en-US" dirty="0" smtClean="0"/>
-              <a:t>. U-</a:t>
-            </a:r>
-          </a:p>
-          <a:p>
-            <a:r>
-              <a:rPr lang="en-US" dirty="0" smtClean="0"/>
-              <a:t>6. </a:t>
-            </a:r>
-            <a:r>
-              <a:rPr lang="en-US" dirty="0" err="1"/>
-              <a:t>goto</a:t>
-            </a:r>
-            <a:r>
-              <a:rPr lang="en-US" dirty="0"/>
-              <a:t> </a:t>
-            </a:r>
-            <a:r>
-              <a:rPr lang="en-US" dirty="0" smtClean="0"/>
-              <a:t>3</a:t>
-            </a:r>
-          </a:p>
-        </p:txBody>
-      </p:sp>
-      <p:sp>
-        <p:nvSpPr>
-          <p:cNvPr id="5" name="TextBox 4"/>
-          <p:cNvSpPr txBox="1"/>
-          <p:nvPr/>
-        </p:nvSpPr>
-        <p:spPr>
-          <a:xfrm>
-            <a:off x="1408018" y="305832"/>
-            <a:ext cx="7107384" cy="1200329"/>
-          </a:xfrm>
-          <a:prstGeom prst="rect">
-            <a:avLst/>
-          </a:prstGeom>
-          <a:noFill/>
-        </p:spPr>
-        <p:txBody>
-          <a:bodyPr wrap="none" rtlCol="0">
-            <a:spAutoFit/>
-          </a:bodyPr>
-          <a:lstStyle/>
-          <a:p>
-            <a:r>
-              <a:rPr lang="en-US" sz="7200" dirty="0" smtClean="0">
-                <a:solidFill>
-                  <a:srgbClr val="0000FF"/>
-                </a:solidFill>
-                <a:latin typeface="Comic Sans MS"/>
-                <a:cs typeface="Comic Sans MS"/>
-              </a:rPr>
-              <a:t>T :</a:t>
-            </a:r>
-            <a:r>
-              <a:rPr lang="en-US" sz="7200" dirty="0" smtClean="0">
-                <a:solidFill>
-                  <a:srgbClr val="0000FF"/>
-                </a:solidFill>
-                <a:latin typeface="Euclid S\"/>
-                <a:cs typeface="Euclid S\"/>
-              </a:rPr>
-              <a:t>=</a:t>
-            </a:r>
-            <a:r>
-              <a:rPr lang="en-US" sz="7200" dirty="0" smtClean="0">
-                <a:solidFill>
-                  <a:srgbClr val="0000FF"/>
-                </a:solidFill>
-                <a:latin typeface="Comic Sans MS"/>
-                <a:cs typeface="Comic Sans MS"/>
-              </a:rPr>
-              <a:t> R+S   </a:t>
-            </a:r>
-            <a:r>
-              <a:rPr lang="en-US" sz="7200" dirty="0" smtClean="0">
-                <a:latin typeface="Comic Sans MS"/>
-                <a:cs typeface="Comic Sans MS"/>
-              </a:rPr>
-              <a:t>(Add)</a:t>
-            </a:r>
-            <a:endParaRPr lang="en-US" sz="7200" dirty="0">
-              <a:solidFill>
-                <a:srgbClr val="0000FF"/>
-              </a:solidFill>
-              <a:latin typeface="Comic Sans MS"/>
-              <a:cs typeface="Comic Sans MS"/>
-            </a:endParaRPr>
-          </a:p>
-        </p:txBody>
-      </p:sp>
-      <p:graphicFrame>
-        <p:nvGraphicFramePr>
-          <p:cNvPr id="7" name="Object 6"/>
-          <p:cNvGraphicFramePr>
-            <a:graphicFrameLocks noChangeAspect="1"/>
-          </p:cNvGraphicFramePr>
-          <p:nvPr>
-            <p:extLst>
-              <p:ext uri="{D42A27DB-BD31-4B8C-83A1-F6EECF244321}">
-                <p14:modId xmlns:p14="http://schemas.microsoft.com/office/powerpoint/2010/main" val="1856121898"/>
-              </p:ext>
-            </p:extLst>
-          </p:nvPr>
-        </p:nvGraphicFramePr>
-        <p:xfrm>
-          <a:off x="3306886" y="2657726"/>
-          <a:ext cx="720793" cy="2797704"/>
-        </p:xfrm>
-        <a:graphic>
-          <a:graphicData uri="http://schemas.openxmlformats.org/presentationml/2006/ole">
-            <mc:AlternateContent xmlns:mc="http://schemas.openxmlformats.org/markup-compatibility/2006">
-              <mc:Choice xmlns:v="urn:schemas-microsoft-com:vml" Requires="v">
-                <p:oleObj spid="_x0000_s7170" name="Equation" r:id="rId3" imgW="203200" imgH="787400" progId="Equation.DSMT4">
-                  <p:embed/>
-                </p:oleObj>
-              </mc:Choice>
-              <mc:Fallback>
-                <p:oleObj name="Equation" r:id="rId3" imgW="203200" imgH="787400" progId="Equation.DSMT4">
-                  <p:embed/>
-                  <p:pic>
-                    <p:nvPicPr>
-                      <p:cNvPr id="0" name=""/>
-                      <p:cNvPicPr/>
-                      <p:nvPr/>
-                    </p:nvPicPr>
-                    <p:blipFill>
-                      <a:blip r:embed="rId4"/>
-                      <a:stretch>
-                        <a:fillRect/>
-                      </a:stretch>
-                    </p:blipFill>
-                    <p:spPr>
-                      <a:xfrm>
-                        <a:off x="3306886" y="2657726"/>
-                        <a:ext cx="720793" cy="2797704"/>
-                      </a:xfrm>
-                      <a:prstGeom prst="rect">
-                        <a:avLst/>
-                      </a:prstGeom>
-                    </p:spPr>
-                  </p:pic>
-                </p:oleObj>
-              </mc:Fallback>
-            </mc:AlternateContent>
-          </a:graphicData>
-        </a:graphic>
-      </p:graphicFrame>
-      <p:sp>
-        <p:nvSpPr>
-          <p:cNvPr id="8" name="TextBox 7"/>
-          <p:cNvSpPr txBox="1"/>
-          <p:nvPr/>
-        </p:nvSpPr>
-        <p:spPr>
-          <a:xfrm>
-            <a:off x="4206758" y="3566109"/>
-            <a:ext cx="2943159" cy="923330"/>
-          </a:xfrm>
-          <a:prstGeom prst="rect">
-            <a:avLst/>
-          </a:prstGeom>
-          <a:noFill/>
-        </p:spPr>
-        <p:txBody>
-          <a:bodyPr wrap="none" rtlCol="0">
-            <a:spAutoFit/>
-          </a:bodyPr>
-          <a:lstStyle/>
-          <a:p>
-            <a:r>
-              <a:rPr lang="en-US" sz="5400" dirty="0" smtClean="0">
-                <a:solidFill>
-                  <a:srgbClr val="0000FF"/>
-                </a:solidFill>
-                <a:latin typeface="Comic Sans MS"/>
-                <a:cs typeface="Comic Sans MS"/>
-              </a:rPr>
-              <a:t>T := T+U</a:t>
-            </a:r>
-            <a:endParaRPr lang="en-US" sz="5400" dirty="0">
-              <a:solidFill>
-                <a:srgbClr val="0000FF"/>
-              </a:solidFill>
-              <a:latin typeface="Comic Sans MS"/>
-              <a:cs typeface="Comic Sans MS"/>
-            </a:endParaRPr>
-          </a:p>
-        </p:txBody>
-      </p:sp>
-    </p:spTree>
-    <p:extLst>
-      <p:ext uri="{BB962C8B-B14F-4D97-AF65-F5344CB8AC3E}">
-        <p14:creationId xmlns:p14="http://schemas.microsoft.com/office/powerpoint/2010/main" val="1926243157"/>
-      </p:ext>
-    </p:extLst>
-  </p:cSld>
-  <p:clrMapOvr>
-    <a:masterClrMapping/>
-  </p:clrMapOvr>
-  <p:transition xmlns:p14="http://schemas.microsoft.com/office/powerpoint/2010/main" spd="slow" advClick="0">
-    <p:fade/>
-  </p:transition>
-  <p:timing>
-    <p:tnLst>
-      <p:par>
-        <p:cTn xmlns:p14="http://schemas.microsoft.com/office/powerpoint/2010/main" id="1" dur="indefinite" restart="never" nodeType="tmRoot"/>
-      </p:par>
-    </p:tnLst>
-  </p:timing>
-</p:sld>
-</file>
-
-<file path=ppt/slides/slide15.xml><?xml version="1.0" encoding="utf-8"?>
-<p:sld xmlns:a="http://schemas.openxmlformats.org/drawingml/2006/main" xmlns:r="http://schemas.openxmlformats.org/officeDocument/2006/relationships" xmlns:p="http://schemas.openxmlformats.org/presentationml/2006/main">
-  <p:cSld>
-    <p:spTree>
-      <p:nvGrpSpPr>
-        <p:cNvPr id="1" name=""/>
-        <p:cNvGrpSpPr/>
-        <p:nvPr/>
-      </p:nvGrpSpPr>
-      <p:grpSpPr>
-        <a:xfrm>
-          <a:off x="0" y="0"/>
-          <a:ext cx="0" cy="0"/>
-          <a:chOff x="0" y="0"/>
-          <a:chExt cx="0" cy="0"/>
-        </a:xfrm>
-      </p:grpSpPr>
-      <p:sp>
-        <p:nvSpPr>
-          <p:cNvPr id="3" name="Content Placeholder 2"/>
-          <p:cNvSpPr>
-            <a:spLocks noGrp="1"/>
-          </p:cNvSpPr>
-          <p:nvPr>
-            <p:ph idx="1"/>
-          </p:nvPr>
-        </p:nvSpPr>
-        <p:spPr>
-          <a:xfrm>
-            <a:off x="2285109" y="1671421"/>
-            <a:ext cx="4480531" cy="4560427"/>
-          </a:xfrm>
-        </p:spPr>
-        <p:txBody>
-          <a:bodyPr/>
-          <a:lstStyle/>
-          <a:p>
-            <a:r>
-              <a:rPr lang="en-US" sz="5400" dirty="0" smtClean="0"/>
-              <a:t>1. T := 0          </a:t>
-            </a:r>
-          </a:p>
-          <a:p>
-            <a:r>
-              <a:rPr lang="en-US" sz="5400" dirty="0" smtClean="0"/>
-              <a:t>2. </a:t>
-            </a:r>
-            <a:r>
-              <a:rPr lang="en-US" sz="5400" dirty="0"/>
-              <a:t>[R? halt </a:t>
-            </a:r>
-            <a:r>
-              <a:rPr lang="en-US" sz="5400" dirty="0" smtClean="0"/>
-              <a:t>3]             </a:t>
-            </a:r>
-          </a:p>
-          <a:p>
-            <a:r>
-              <a:rPr lang="en-US" sz="5400" dirty="0" smtClean="0"/>
-              <a:t>3. T := T</a:t>
-            </a:r>
-            <a:r>
-              <a:rPr lang="en-US" sz="5400" dirty="0"/>
-              <a:t>+</a:t>
-            </a:r>
-            <a:r>
-              <a:rPr lang="en-US" sz="5400" dirty="0" smtClean="0"/>
-              <a:t>S</a:t>
-            </a:r>
-          </a:p>
-          <a:p>
-            <a:r>
-              <a:rPr lang="en-US" sz="5400" dirty="0" smtClean="0"/>
-              <a:t>4. </a:t>
-            </a:r>
-            <a:r>
-              <a:rPr lang="en-US" sz="5400" dirty="0" err="1" smtClean="0"/>
-              <a:t>goto</a:t>
-            </a:r>
-            <a:r>
-              <a:rPr lang="en-US" sz="5400" dirty="0" smtClean="0"/>
-              <a:t> 2</a:t>
-            </a:r>
-            <a:endParaRPr lang="en-US" sz="5400" dirty="0"/>
-          </a:p>
-        </p:txBody>
-      </p:sp>
-      <p:sp>
-        <p:nvSpPr>
-          <p:cNvPr id="8" name="TextBox 7"/>
-          <p:cNvSpPr txBox="1"/>
-          <p:nvPr/>
-        </p:nvSpPr>
-        <p:spPr>
-          <a:xfrm>
-            <a:off x="1637997" y="343173"/>
-            <a:ext cx="3554917" cy="1107996"/>
-          </a:xfrm>
-          <a:prstGeom prst="rect">
-            <a:avLst/>
-          </a:prstGeom>
-          <a:noFill/>
-        </p:spPr>
-        <p:txBody>
-          <a:bodyPr wrap="none" rtlCol="0">
-            <a:spAutoFit/>
-          </a:bodyPr>
-          <a:lstStyle/>
-          <a:p>
-            <a:r>
-              <a:rPr lang="en-US" sz="6600" dirty="0" smtClean="0">
-                <a:solidFill>
-                  <a:srgbClr val="0000FF"/>
-                </a:solidFill>
-                <a:latin typeface="Comic Sans MS"/>
-                <a:cs typeface="Comic Sans MS"/>
-              </a:rPr>
-              <a:t>T :</a:t>
-            </a:r>
-            <a:r>
-              <a:rPr lang="en-US" sz="6600" dirty="0" smtClean="0">
-                <a:solidFill>
-                  <a:srgbClr val="0000FF"/>
-                </a:solidFill>
-                <a:latin typeface="Euclid S\"/>
-                <a:cs typeface="Euclid S\"/>
-              </a:rPr>
-              <a:t>=</a:t>
-            </a:r>
-            <a:r>
-              <a:rPr lang="en-US" sz="6600" dirty="0" smtClean="0">
-                <a:solidFill>
-                  <a:srgbClr val="0000FF"/>
-                </a:solidFill>
-                <a:latin typeface="Comic Sans MS"/>
-                <a:cs typeface="Comic Sans MS"/>
-              </a:rPr>
-              <a:t> R</a:t>
-            </a:r>
-            <a:r>
-              <a:rPr lang="en-US" sz="6600" b="1" dirty="0">
-                <a:solidFill>
-                  <a:srgbClr val="0000FF"/>
-                </a:solidFill>
-                <a:latin typeface="Euclid Symbol" charset="2"/>
-                <a:cs typeface="Euclid Symbol" charset="2"/>
-              </a:rPr>
-              <a:t>∗</a:t>
-            </a:r>
-            <a:r>
-              <a:rPr lang="en-US" sz="6600" dirty="0" smtClean="0">
-                <a:solidFill>
-                  <a:srgbClr val="0000FF"/>
-                </a:solidFill>
-                <a:latin typeface="Comic Sans MS"/>
-                <a:cs typeface="Comic Sans MS"/>
-              </a:rPr>
-              <a:t>S</a:t>
-            </a:r>
-          </a:p>
-        </p:txBody>
-      </p:sp>
-      <p:sp>
-        <p:nvSpPr>
-          <p:cNvPr id="10" name="TextBox 9"/>
-          <p:cNvSpPr txBox="1"/>
-          <p:nvPr/>
-        </p:nvSpPr>
-        <p:spPr>
-          <a:xfrm>
-            <a:off x="5732990" y="462937"/>
-            <a:ext cx="2948343" cy="830997"/>
-          </a:xfrm>
-          <a:prstGeom prst="rect">
-            <a:avLst/>
-          </a:prstGeom>
-          <a:noFill/>
-        </p:spPr>
-        <p:txBody>
-          <a:bodyPr wrap="none" rtlCol="0">
-            <a:spAutoFit/>
-          </a:bodyPr>
-          <a:lstStyle/>
-          <a:p>
-            <a:r>
-              <a:rPr lang="en-US" sz="4800" dirty="0" smtClean="0">
-                <a:latin typeface="Comic Sans MS"/>
-                <a:cs typeface="Comic Sans MS"/>
-              </a:rPr>
-              <a:t>(Multiply)  </a:t>
-            </a:r>
-            <a:endParaRPr lang="en-US" sz="4800" dirty="0">
-              <a:latin typeface="Comic Sans MS"/>
-              <a:cs typeface="Comic Sans MS"/>
-            </a:endParaRPr>
-          </a:p>
-        </p:txBody>
-      </p:sp>
-    </p:spTree>
-    <p:extLst>
-      <p:ext uri="{BB962C8B-B14F-4D97-AF65-F5344CB8AC3E}">
-        <p14:creationId xmlns:p14="http://schemas.microsoft.com/office/powerpoint/2010/main" val="3953662585"/>
-      </p:ext>
-    </p:extLst>
-  </p:cSld>
-  <p:clrMapOvr>
-    <a:masterClrMapping/>
-  </p:clrMapOvr>
   <p:timing>
     <p:tnLst>
       <p:par>
@@ -6113,7 +6113,7 @@
             <a:graphicData uri="http://schemas.openxmlformats.org/presentationml/2006/ole">
               <mc:AlternateContent xmlns:mc="http://schemas.openxmlformats.org/markup-compatibility/2006">
                 <mc:Choice xmlns:v="urn:schemas-microsoft-com:vml" Requires="v">
-                  <p:oleObj spid="_x0000_s11268" name="Equation" r:id="rId3" imgW="203200" imgH="787400" progId="Equation.DSMT4">
+                  <p:oleObj spid="_x0000_s11269" name="Equation" r:id="rId3" imgW="203200" imgH="787400" progId="Equation.DSMT4">
                     <p:embed/>
                   </p:oleObj>
                 </mc:Choice>
@@ -6713,7 +6713,7 @@
             <a:graphicData uri="http://schemas.openxmlformats.org/presentationml/2006/ole">
               <mc:AlternateContent xmlns:mc="http://schemas.openxmlformats.org/markup-compatibility/2006">
                 <mc:Choice xmlns:v="urn:schemas-microsoft-com:vml" Requires="v">
-                  <p:oleObj spid="_x0000_s8198" name="Equation" r:id="rId3" imgW="203200" imgH="787400" progId="Equation.DSMT4">
+                  <p:oleObj spid="_x0000_s8199" name="Equation" r:id="rId3" imgW="203200" imgH="787400" progId="Equation.DSMT4">
                     <p:embed/>
                   </p:oleObj>
                 </mc:Choice>

</xml_diff>

<commit_message>
drafting CP_pred_calc_model_N_arrows, typo predicate-logic5.pptx
</commit_message>
<xml_diff>
--- a/spring16/slidesS16/predicate-logic5.pptx
+++ b/spring16/slidesS16/predicate-logic5.pptx
@@ -2228,11 +2228,11 @@
   <p:clrMapOvr>
     <a:masterClrMapping/>
   </p:clrMapOvr>
-  <mc:AlternateContent xmlns:mc="http://schemas.openxmlformats.org/markup-compatibility/2006">
-    <mc:Choice xmlns:p14="http://schemas.microsoft.com/office/powerpoint/2010/main" Requires="p14">
+  <mc:AlternateContent xmlns:mc="http://schemas.openxmlformats.org/markup-compatibility/2006" xmlns:p14="http://schemas.microsoft.com/office/powerpoint/2010/main">
+    <mc:Choice Requires="p14">
       <p:transition p14:dur="0" advClick="0"/>
     </mc:Choice>
-    <mc:Fallback>
+    <mc:Fallback xmlns="">
       <p:transition xmlns:p14="http://schemas.microsoft.com/office/powerpoint/2010/main" advClick="0"/>
     </mc:Fallback>
   </mc:AlternateContent>
@@ -2615,7 +2615,7 @@
             <a:graphicData uri="http://schemas.openxmlformats.org/presentationml/2006/ole">
               <mc:AlternateContent xmlns:mc="http://schemas.openxmlformats.org/markup-compatibility/2006">
                 <mc:Choice xmlns:v="urn:schemas-microsoft-com:vml" Requires="v">
-                  <p:oleObj spid="_x0000_s9223" name="Equation" r:id="rId3" imgW="203200" imgH="787400" progId="Equation.DSMT4">
+                  <p:oleObj spid="_x0000_s9226" name="Equation" r:id="rId3" imgW="203200" imgH="787400" progId="Equation.DSMT4">
                     <p:embed/>
                   </p:oleObj>
                 </mc:Choice>
@@ -3363,7 +3363,7 @@
           <a:graphicData uri="http://schemas.openxmlformats.org/presentationml/2006/ole">
             <mc:AlternateContent xmlns:mc="http://schemas.openxmlformats.org/markup-compatibility/2006">
               <mc:Choice xmlns:v="urn:schemas-microsoft-com:vml" Requires="v">
-                <p:oleObj spid="_x0000_s7175" name="Equation" r:id="rId3" imgW="203200" imgH="787400" progId="Equation.DSMT4">
+                <p:oleObj spid="_x0000_s7178" name="Equation" r:id="rId3" imgW="203200" imgH="787400" progId="Equation.DSMT4">
                   <p:embed/>
                 </p:oleObj>
               </mc:Choice>
@@ -3492,8 +3492,8 @@
         </p:nvSpPr>
         <p:spPr>
           <a:xfrm>
-            <a:off x="2285109" y="1671421"/>
-            <a:ext cx="4480531" cy="4560427"/>
+            <a:off x="2237187" y="1323953"/>
+            <a:ext cx="4579630" cy="5122178"/>
           </a:xfrm>
         </p:spPr>
         <p:txBody>
@@ -3536,7 +3536,18 @@
           <a:p>
             <a:r>
               <a:rPr lang="en-US" sz="5400" dirty="0" smtClean="0"/>
-              <a:t>4. </a:t>
+              <a:t>4.  R</a:t>
+            </a:r>
+            <a:r>
+              <a:rPr lang="en-US" sz="5400" b="1" baseline="30000" dirty="0" smtClean="0"/>
+              <a:t>-</a:t>
+            </a:r>
+            <a:endParaRPr lang="en-US" sz="5400" b="1" baseline="30000" dirty="0" smtClean="0"/>
+          </a:p>
+          <a:p>
+            <a:r>
+              <a:rPr lang="en-US" sz="5400" dirty="0" smtClean="0"/>
+              <a:t>5. </a:t>
             </a:r>
             <a:r>
               <a:rPr lang="en-US" sz="5400" dirty="0" err="1" smtClean="0"/>
@@ -3829,7 +3840,7 @@
           <a:graphicData uri="http://schemas.openxmlformats.org/presentationml/2006/ole">
             <mc:AlternateContent xmlns:mc="http://schemas.openxmlformats.org/markup-compatibility/2006">
               <mc:Choice xmlns:v="urn:schemas-microsoft-com:vml" Requires="v">
-                <p:oleObj spid="_x0000_s4108" name="Equation" r:id="rId3" imgW="203200" imgH="787400" progId="Equation.DSMT4">
+                <p:oleObj spid="_x0000_s4111" name="Equation" r:id="rId3" imgW="203200" imgH="787400" progId="Equation.DSMT4">
                   <p:embed/>
                 </p:oleObj>
               </mc:Choice>
@@ -5194,15 +5205,7 @@
                   <a:srgbClr val="0000FF"/>
                 </a:solidFill>
               </a:rPr>
-              <a:t>[R? k k</a:t>
-            </a:r>
-            <a:r>
-              <a:rPr lang="en-US" sz="4000" dirty="0" smtClean="0">
-                <a:solidFill>
-                  <a:srgbClr val="0000FF"/>
-                </a:solidFill>
-              </a:rPr>
-              <a:t>] </a:t>
+              <a:t>[R? k k] </a:t>
             </a:r>
             <a:r>
               <a:rPr lang="en-US" sz="4000" dirty="0" smtClean="0"/>
@@ -6532,7 +6535,7 @@
             <a:graphicData uri="http://schemas.openxmlformats.org/presentationml/2006/ole">
               <mc:AlternateContent xmlns:mc="http://schemas.openxmlformats.org/markup-compatibility/2006">
                 <mc:Choice xmlns:v="urn:schemas-microsoft-com:vml" Requires="v">
-                  <p:oleObj spid="_x0000_s11273" name="Equation" r:id="rId3" imgW="203200" imgH="787400" progId="Equation.DSMT4">
+                  <p:oleObj spid="_x0000_s11276" name="Equation" r:id="rId3" imgW="203200" imgH="787400" progId="Equation.DSMT4">
                     <p:embed/>
                   </p:oleObj>
                 </mc:Choice>
@@ -7123,7 +7126,7 @@
             <a:graphicData uri="http://schemas.openxmlformats.org/presentationml/2006/ole">
               <mc:AlternateContent xmlns:mc="http://schemas.openxmlformats.org/markup-compatibility/2006">
                 <mc:Choice xmlns:v="urn:schemas-microsoft-com:vml" Requires="v">
-                  <p:oleObj spid="_x0000_s8203" name="Equation" r:id="rId3" imgW="203200" imgH="787400" progId="Equation.DSMT4">
+                  <p:oleObj spid="_x0000_s8206" name="Equation" r:id="rId3" imgW="203200" imgH="787400" progId="Equation.DSMT4">
                     <p:embed/>
                   </p:oleObj>
                 </mc:Choice>

</xml_diff>